<commit_message>
refactor: This is dynamic refactoring version. Note that this is under coding and this does not work well.
</commit_message>
<xml_diff>
--- a/WakameWatcher.pptx
+++ b/WakameWatcher.pptx
@@ -5,7 +5,7 @@
     <p:sldMasterId id="2147483648" r:id="rId1"/>
   </p:sldMasterIdLst>
   <p:notesMasterIdLst>
-    <p:notesMasterId r:id="rId11"/>
+    <p:notesMasterId r:id="rId10"/>
   </p:notesMasterIdLst>
   <p:sldIdLst>
     <p:sldId id="256" r:id="rId2"/>
@@ -15,8 +15,7 @@
     <p:sldId id="262" r:id="rId6"/>
     <p:sldId id="263" r:id="rId7"/>
     <p:sldId id="264" r:id="rId8"/>
-    <p:sldId id="265" r:id="rId9"/>
-    <p:sldId id="261" r:id="rId10"/>
+    <p:sldId id="266" r:id="rId9"/>
   </p:sldIdLst>
   <p:sldSz cx="12192000" cy="6858000"/>
   <p:notesSz cx="6858000" cy="9144000"/>
@@ -135,12 +134,7 @@
         <p14:section name="開発過程" id="{A64FBB6F-DD6F-4521-BBEB-722EFD11EB21}">
           <p14:sldIdLst>
             <p14:sldId id="264"/>
-            <p14:sldId id="265"/>
-          </p14:sldIdLst>
-        </p14:section>
-        <p14:section name="参考資料" id="{2BA42EB1-52BC-4037-82A1-EC6031267E64}">
-          <p14:sldIdLst>
-            <p14:sldId id="261"/>
+            <p14:sldId id="266"/>
           </p14:sldIdLst>
         </p14:section>
       </p14:sectionLst>
@@ -234,7 +228,7 @@
           <a:p>
             <a:fld id="{2061DEDF-9378-4693-8222-65C54ECDF59A}" type="datetimeFigureOut">
               <a:rPr kumimoji="1" lang="ja-JP" altLang="en-US" smtClean="0"/>
-              <a:t>2018/10/3</a:t>
+              <a:t>2018/10/7</a:t>
             </a:fld>
             <a:endParaRPr kumimoji="1" lang="ja-JP" altLang="en-US"/>
           </a:p>
@@ -731,7 +725,7 @@
     </p:spTree>
     <p:extLst>
       <p:ext uri="{BB962C8B-B14F-4D97-AF65-F5344CB8AC3E}">
-        <p14:creationId xmlns:p14="http://schemas.microsoft.com/office/powerpoint/2010/main" val="2614838736"/>
+        <p14:creationId xmlns:p14="http://schemas.microsoft.com/office/powerpoint/2010/main" val="1356556577"/>
       </p:ext>
     </p:extLst>
   </p:cSld>
@@ -870,7 +864,7 @@
           <a:p>
             <a:fld id="{5AB1C2F8-01C6-2A43-BFDE-0E7A8C3DAD71}" type="datetimeFigureOut">
               <a:rPr kumimoji="1" lang="ja-JP" altLang="en-US" smtClean="0"/>
-              <a:t>2018/10/3</a:t>
+              <a:t>2018/10/7</a:t>
             </a:fld>
             <a:endParaRPr kumimoji="1" lang="ja-JP" altLang="en-US"/>
           </a:p>
@@ -1070,7 +1064,7 @@
           <a:p>
             <a:fld id="{5AB1C2F8-01C6-2A43-BFDE-0E7A8C3DAD71}" type="datetimeFigureOut">
               <a:rPr kumimoji="1" lang="ja-JP" altLang="en-US" smtClean="0"/>
-              <a:t>2018/10/3</a:t>
+              <a:t>2018/10/7</a:t>
             </a:fld>
             <a:endParaRPr kumimoji="1" lang="ja-JP" altLang="en-US"/>
           </a:p>
@@ -1280,7 +1274,7 @@
           <a:p>
             <a:fld id="{5AB1C2F8-01C6-2A43-BFDE-0E7A8C3DAD71}" type="datetimeFigureOut">
               <a:rPr kumimoji="1" lang="ja-JP" altLang="en-US" smtClean="0"/>
-              <a:t>2018/10/3</a:t>
+              <a:t>2018/10/7</a:t>
             </a:fld>
             <a:endParaRPr kumimoji="1" lang="ja-JP" altLang="en-US"/>
           </a:p>
@@ -1514,7 +1508,7 @@
           <a:p>
             <a:fld id="{5AB1C2F8-01C6-2A43-BFDE-0E7A8C3DAD71}" type="datetimeFigureOut">
               <a:rPr kumimoji="1" lang="ja-JP" altLang="en-US" smtClean="0"/>
-              <a:t>2018/10/3</a:t>
+              <a:t>2018/10/7</a:t>
             </a:fld>
             <a:endParaRPr kumimoji="1" lang="ja-JP" altLang="en-US"/>
           </a:p>
@@ -1759,7 +1753,7 @@
           <a:p>
             <a:fld id="{5AB1C2F8-01C6-2A43-BFDE-0E7A8C3DAD71}" type="datetimeFigureOut">
               <a:rPr kumimoji="1" lang="ja-JP" altLang="en-US" smtClean="0"/>
-              <a:t>2018/10/3</a:t>
+              <a:t>2018/10/7</a:t>
             </a:fld>
             <a:endParaRPr kumimoji="1" lang="ja-JP" altLang="en-US"/>
           </a:p>
@@ -2052,7 +2046,7 @@
           <a:p>
             <a:fld id="{5AB1C2F8-01C6-2A43-BFDE-0E7A8C3DAD71}" type="datetimeFigureOut">
               <a:rPr kumimoji="1" lang="ja-JP" altLang="en-US" smtClean="0"/>
-              <a:t>2018/10/3</a:t>
+              <a:t>2018/10/7</a:t>
             </a:fld>
             <a:endParaRPr kumimoji="1" lang="ja-JP" altLang="en-US"/>
           </a:p>
@@ -2480,7 +2474,7 @@
           <a:p>
             <a:fld id="{5AB1C2F8-01C6-2A43-BFDE-0E7A8C3DAD71}" type="datetimeFigureOut">
               <a:rPr kumimoji="1" lang="ja-JP" altLang="en-US" smtClean="0"/>
-              <a:t>2018/10/3</a:t>
+              <a:t>2018/10/7</a:t>
             </a:fld>
             <a:endParaRPr kumimoji="1" lang="ja-JP" altLang="en-US"/>
           </a:p>
@@ -2597,7 +2591,7 @@
           <a:p>
             <a:fld id="{5AB1C2F8-01C6-2A43-BFDE-0E7A8C3DAD71}" type="datetimeFigureOut">
               <a:rPr kumimoji="1" lang="ja-JP" altLang="en-US" smtClean="0"/>
-              <a:t>2018/10/3</a:t>
+              <a:t>2018/10/7</a:t>
             </a:fld>
             <a:endParaRPr kumimoji="1" lang="ja-JP" altLang="en-US"/>
           </a:p>
@@ -2692,7 +2686,7 @@
           <a:p>
             <a:fld id="{5AB1C2F8-01C6-2A43-BFDE-0E7A8C3DAD71}" type="datetimeFigureOut">
               <a:rPr kumimoji="1" lang="ja-JP" altLang="en-US" smtClean="0"/>
-              <a:t>2018/10/3</a:t>
+              <a:t>2018/10/7</a:t>
             </a:fld>
             <a:endParaRPr kumimoji="1" lang="ja-JP" altLang="en-US"/>
           </a:p>
@@ -2999,7 +2993,7 @@
           <a:p>
             <a:fld id="{5AB1C2F8-01C6-2A43-BFDE-0E7A8C3DAD71}" type="datetimeFigureOut">
               <a:rPr kumimoji="1" lang="ja-JP" altLang="en-US" smtClean="0"/>
-              <a:t>2018/10/3</a:t>
+              <a:t>2018/10/7</a:t>
             </a:fld>
             <a:endParaRPr kumimoji="1" lang="ja-JP" altLang="en-US"/>
           </a:p>
@@ -3251,7 +3245,7 @@
           <a:p>
             <a:fld id="{5AB1C2F8-01C6-2A43-BFDE-0E7A8C3DAD71}" type="datetimeFigureOut">
               <a:rPr kumimoji="1" lang="ja-JP" altLang="en-US" smtClean="0"/>
-              <a:t>2018/10/3</a:t>
+              <a:t>2018/10/7</a:t>
             </a:fld>
             <a:endParaRPr kumimoji="1" lang="ja-JP" altLang="en-US"/>
           </a:p>
@@ -3494,7 +3488,7 @@
           <a:p>
             <a:fld id="{5AB1C2F8-01C6-2A43-BFDE-0E7A8C3DAD71}" type="datetimeFigureOut">
               <a:rPr kumimoji="1" lang="ja-JP" altLang="en-US" smtClean="0"/>
-              <a:t>2018/10/3</a:t>
+              <a:t>2018/10/7</a:t>
             </a:fld>
             <a:endParaRPr kumimoji="1" lang="ja-JP" altLang="en-US"/>
           </a:p>
@@ -5939,8 +5933,8 @@
         </p:nvSpPr>
         <p:spPr>
           <a:xfrm>
-            <a:off x="8507914" y="2196945"/>
-            <a:ext cx="1438507" cy="639336"/>
+            <a:off x="8351792" y="2196945"/>
+            <a:ext cx="1750752" cy="639336"/>
           </a:xfrm>
           <a:prstGeom prst="rect">
             <a:avLst/>
@@ -5966,12 +5960,24 @@
           <a:p>
             <a:pPr algn="ctr"/>
             <a:r>
-              <a:rPr kumimoji="1" lang="en-US" altLang="ja-JP" dirty="0"/>
-              <a:t>Web</a:t>
-            </a:r>
-            <a:r>
-              <a:rPr kumimoji="1" lang="ja-JP" altLang="en-US" dirty="0"/>
+              <a:rPr kumimoji="1" lang="ja-JP" altLang="en-US" dirty="0" smtClean="0"/>
+              <a:t>モニター</a:t>
+            </a:r>
+            <a:endParaRPr kumimoji="1" lang="en-US" altLang="ja-JP" dirty="0" smtClean="0"/>
+          </a:p>
+          <a:p>
+            <a:pPr algn="ctr"/>
+            <a:r>
+              <a:rPr lang="en-US" altLang="ja-JP" dirty="0" smtClean="0"/>
+              <a:t>(Web</a:t>
+            </a:r>
+            <a:r>
+              <a:rPr lang="ja-JP" altLang="en-US" dirty="0" smtClean="0"/>
               <a:t>サイト</a:t>
+            </a:r>
+            <a:r>
+              <a:rPr lang="en-US" altLang="ja-JP" dirty="0" smtClean="0"/>
+              <a:t>)</a:t>
             </a:r>
             <a:endParaRPr kumimoji="1" lang="en-US" altLang="ja-JP" dirty="0"/>
           </a:p>
@@ -11272,7 +11278,7 @@
         <p:spPr>
           <a:xfrm>
             <a:off x="7152313" y="4945253"/>
-            <a:ext cx="4063933" cy="923330"/>
+            <a:ext cx="4192173" cy="923330"/>
           </a:xfrm>
           <a:prstGeom prst="rect">
             <a:avLst/>
@@ -11291,7 +11297,7 @@
             </a:pPr>
             <a:r>
               <a:rPr lang="en-US" altLang="ja-JP" dirty="0" smtClean="0"/>
-              <a:t>1</a:t>
+              <a:t>10</a:t>
             </a:r>
             <a:r>
               <a:rPr lang="ja-JP" altLang="en-US" dirty="0" smtClean="0"/>
@@ -11392,8 +11398,8 @@
         </p:nvSpPr>
         <p:spPr>
           <a:xfrm>
-            <a:off x="1779084" y="2218124"/>
-            <a:ext cx="1438507" cy="639336"/>
+            <a:off x="1654385" y="2218124"/>
+            <a:ext cx="1687906" cy="639336"/>
           </a:xfrm>
           <a:prstGeom prst="rect">
             <a:avLst/>
@@ -11419,9 +11425,10 @@
           <a:p>
             <a:pPr algn="ctr"/>
             <a:r>
-              <a:rPr kumimoji="1" lang="ja-JP" altLang="en-US" dirty="0"/>
-              <a:t>室内</a:t>
-            </a:r>
+              <a:rPr kumimoji="1" lang="ja-JP" altLang="en-US" dirty="0" smtClean="0"/>
+              <a:t>監視システム</a:t>
+            </a:r>
+            <a:endParaRPr kumimoji="1" lang="ja-JP" altLang="en-US" dirty="0"/>
           </a:p>
         </p:txBody>
       </p:sp>
@@ -12690,7 +12697,7 @@
         <p:spPr>
           <a:xfrm>
             <a:off x="3269313" y="5011144"/>
-            <a:ext cx="1752403" cy="369332"/>
+            <a:ext cx="1880643" cy="369332"/>
           </a:xfrm>
           <a:prstGeom prst="rect">
             <a:avLst/>
@@ -12717,7 +12724,7 @@
             </a:r>
             <a:r>
               <a:rPr lang="en-US" altLang="ja-JP" dirty="0" smtClean="0"/>
-              <a:t>1</a:t>
+              <a:t>10</a:t>
             </a:r>
             <a:r>
               <a:rPr lang="ja-JP" altLang="en-US" dirty="0" smtClean="0"/>
@@ -14137,7 +14144,7 @@
 </file>
 
 <file path=ppt/slides/slide7.xml><?xml version="1.0" encoding="utf-8"?>
-<p:sld xmlns:a="http://schemas.openxmlformats.org/drawingml/2006/main" xmlns:r="http://schemas.openxmlformats.org/officeDocument/2006/relationships" xmlns:p="http://schemas.openxmlformats.org/presentationml/2006/main" show="0">
+<p:sld xmlns:a="http://schemas.openxmlformats.org/drawingml/2006/main" xmlns:r="http://schemas.openxmlformats.org/officeDocument/2006/relationships" xmlns:p="http://schemas.openxmlformats.org/presentationml/2006/main">
   <p:cSld>
     <p:spTree>
       <p:nvGrpSpPr>
@@ -14221,7 +14228,7 @@
 </file>
 
 <file path=ppt/slides/slide8.xml><?xml version="1.0" encoding="utf-8"?>
-<p:sld xmlns:a="http://schemas.openxmlformats.org/drawingml/2006/main" xmlns:r="http://schemas.openxmlformats.org/officeDocument/2006/relationships" xmlns:p="http://schemas.openxmlformats.org/presentationml/2006/main" show="0">
+<p:sld xmlns:a="http://schemas.openxmlformats.org/drawingml/2006/main" xmlns:r="http://schemas.openxmlformats.org/officeDocument/2006/relationships" xmlns:p="http://schemas.openxmlformats.org/presentationml/2006/main">
   <p:cSld>
     <p:spTree>
       <p:nvGrpSpPr>
@@ -14252,112 +14259,421 @@
           <a:bodyPr/>
           <a:lstStyle/>
           <a:p>
-            <a:endParaRPr kumimoji="1" lang="ja-JP" altLang="en-US"/>
+            <a:r>
+              <a:rPr lang="ja-JP" altLang="en-US" dirty="0"/>
+              <a:t>用語の</a:t>
+            </a:r>
+            <a:r>
+              <a:rPr lang="ja-JP" altLang="en-US" dirty="0" smtClean="0"/>
+              <a:t>洗い出しと関連付け</a:t>
+            </a:r>
+            <a:endParaRPr kumimoji="1" lang="ja-JP" altLang="en-US" dirty="0"/>
           </a:p>
         </p:txBody>
       </p:sp>
       <p:sp>
         <p:nvSpPr>
-          <p:cNvPr id="7" name="コンテンツ プレースホルダー 6"/>
-          <p:cNvSpPr>
-            <a:spLocks noGrp="1"/>
-          </p:cNvSpPr>
-          <p:nvPr>
-            <p:ph idx="1"/>
-          </p:nvPr>
-        </p:nvSpPr>
-        <p:spPr/>
+          <p:cNvPr id="2" name="テキスト ボックス 1"/>
+          <p:cNvSpPr txBox="1"/>
+          <p:nvPr/>
+        </p:nvSpPr>
+        <p:spPr>
+          <a:xfrm>
+            <a:off x="1800501" y="4711596"/>
+            <a:ext cx="2432076" cy="369332"/>
+          </a:xfrm>
+          <a:prstGeom prst="rect">
+            <a:avLst/>
+          </a:prstGeom>
+        </p:spPr>
+        <p:style>
+          <a:lnRef idx="2">
+            <a:schemeClr val="accent1">
+              <a:shade val="50000"/>
+            </a:schemeClr>
+          </a:lnRef>
+          <a:fillRef idx="1">
+            <a:schemeClr val="accent1"/>
+          </a:fillRef>
+          <a:effectRef idx="0">
+            <a:schemeClr val="accent1"/>
+          </a:effectRef>
+          <a:fontRef idx="minor">
+            <a:schemeClr val="lt1"/>
+          </a:fontRef>
+        </p:style>
         <p:txBody>
-          <a:bodyPr/>
+          <a:bodyPr wrap="none" rtlCol="0">
+            <a:spAutoFit/>
+          </a:bodyPr>
           <a:lstStyle/>
           <a:p>
-            <a:endParaRPr kumimoji="1" lang="ja-JP" altLang="en-US"/>
+            <a:r>
+              <a:rPr kumimoji="1" lang="ja-JP" altLang="en-US" dirty="0" smtClean="0"/>
+              <a:t>撮影 </a:t>
+            </a:r>
+            <a:r>
+              <a:rPr kumimoji="1" lang="en-US" altLang="ja-JP" dirty="0" smtClean="0"/>
+              <a:t>(photographing)</a:t>
+            </a:r>
+            <a:endParaRPr kumimoji="1" lang="ja-JP" altLang="en-US" dirty="0" smtClean="0"/>
           </a:p>
         </p:txBody>
       </p:sp>
-    </p:spTree>
-    <p:extLst>
-      <p:ext uri="{BB962C8B-B14F-4D97-AF65-F5344CB8AC3E}">
-        <p14:creationId xmlns:p14="http://schemas.microsoft.com/office/powerpoint/2010/main" val="24776869"/>
-      </p:ext>
-    </p:extLst>
-  </p:cSld>
-  <p:clrMapOvr>
-    <a:masterClrMapping/>
-  </p:clrMapOvr>
-  <mc:AlternateContent xmlns:mc="http://schemas.openxmlformats.org/markup-compatibility/2006" xmlns:p14="http://schemas.microsoft.com/office/powerpoint/2010/main">
-    <mc:Choice Requires="p14">
-      <p:transition spd="slow" p14:dur="2000"/>
-    </mc:Choice>
-    <mc:Fallback xmlns="">
-      <p:transition spd="slow"/>
-    </mc:Fallback>
-  </mc:AlternateContent>
-</p:sld>
-</file>
-
-<file path=ppt/slides/slide9.xml><?xml version="1.0" encoding="utf-8"?>
-<p:sld xmlns:a="http://schemas.openxmlformats.org/drawingml/2006/main" xmlns:r="http://schemas.openxmlformats.org/officeDocument/2006/relationships" xmlns:p="http://schemas.openxmlformats.org/presentationml/2006/main" show="0">
-  <p:cSld>
-    <p:spTree>
-      <p:nvGrpSpPr>
-        <p:cNvPr id="1" name=""/>
-        <p:cNvGrpSpPr/>
-        <p:nvPr/>
-      </p:nvGrpSpPr>
-      <p:grpSpPr>
-        <a:xfrm>
-          <a:off x="0" y="0"/>
-          <a:ext cx="0" cy="0"/>
-          <a:chOff x="0" y="0"/>
-          <a:chExt cx="0" cy="0"/>
-        </a:xfrm>
-      </p:grpSpPr>
-      <p:sp>
-        <p:nvSpPr>
-          <p:cNvPr id="5" name="タイトル 4"/>
-          <p:cNvSpPr>
-            <a:spLocks noGrp="1"/>
-          </p:cNvSpPr>
-          <p:nvPr>
-            <p:ph type="title"/>
-          </p:nvPr>
-        </p:nvSpPr>
-        <p:spPr/>
+      <p:sp>
+        <p:nvSpPr>
+          <p:cNvPr id="5" name="テキスト ボックス 4"/>
+          <p:cNvSpPr txBox="1"/>
+          <p:nvPr/>
+        </p:nvSpPr>
+        <p:spPr>
+          <a:xfrm>
+            <a:off x="4660011" y="2750496"/>
+            <a:ext cx="2202847" cy="369332"/>
+          </a:xfrm>
+          <a:prstGeom prst="rect">
+            <a:avLst/>
+          </a:prstGeom>
+        </p:spPr>
+        <p:style>
+          <a:lnRef idx="2">
+            <a:schemeClr val="accent1">
+              <a:shade val="50000"/>
+            </a:schemeClr>
+          </a:lnRef>
+          <a:fillRef idx="1">
+            <a:schemeClr val="accent1"/>
+          </a:fillRef>
+          <a:effectRef idx="0">
+            <a:schemeClr val="accent1"/>
+          </a:effectRef>
+          <a:fontRef idx="minor">
+            <a:schemeClr val="lt1"/>
+          </a:fontRef>
+        </p:style>
         <p:txBody>
-          <a:bodyPr/>
+          <a:bodyPr wrap="none" rtlCol="0">
+            <a:spAutoFit/>
+          </a:bodyPr>
           <a:lstStyle/>
           <a:p>
             <a:r>
               <a:rPr kumimoji="1" lang="ja-JP" altLang="en-US" dirty="0" smtClean="0"/>
-              <a:t>参考資料</a:t>
-            </a:r>
-            <a:endParaRPr kumimoji="1" lang="ja-JP" altLang="en-US" dirty="0"/>
+              <a:t>気温 </a:t>
+            </a:r>
+            <a:r>
+              <a:rPr kumimoji="1" lang="en-US" altLang="ja-JP" dirty="0" smtClean="0"/>
+              <a:t>(temperature)</a:t>
+            </a:r>
+            <a:endParaRPr kumimoji="1" lang="ja-JP" altLang="en-US" dirty="0" smtClean="0"/>
           </a:p>
         </p:txBody>
       </p:sp>
       <p:sp>
         <p:nvSpPr>
-          <p:cNvPr id="6" name="テキスト プレースホルダー 5"/>
-          <p:cNvSpPr>
-            <a:spLocks noGrp="1"/>
-          </p:cNvSpPr>
-          <p:nvPr>
-            <p:ph type="body" idx="1"/>
-          </p:nvPr>
-        </p:nvSpPr>
-        <p:spPr/>
+          <p:cNvPr id="8" name="テキスト ボックス 7"/>
+          <p:cNvSpPr txBox="1"/>
+          <p:nvPr/>
+        </p:nvSpPr>
+        <p:spPr>
+          <a:xfrm>
+            <a:off x="4753277" y="3396585"/>
+            <a:ext cx="1810111" cy="369332"/>
+          </a:xfrm>
+          <a:prstGeom prst="rect">
+            <a:avLst/>
+          </a:prstGeom>
+        </p:spPr>
+        <p:style>
+          <a:lnRef idx="2">
+            <a:schemeClr val="accent1">
+              <a:shade val="50000"/>
+            </a:schemeClr>
+          </a:lnRef>
+          <a:fillRef idx="1">
+            <a:schemeClr val="accent1"/>
+          </a:fillRef>
+          <a:effectRef idx="0">
+            <a:schemeClr val="accent1"/>
+          </a:effectRef>
+          <a:fontRef idx="minor">
+            <a:schemeClr val="lt1"/>
+          </a:fontRef>
+        </p:style>
         <p:txBody>
-          <a:bodyPr/>
+          <a:bodyPr wrap="none" rtlCol="0">
+            <a:spAutoFit/>
+          </a:bodyPr>
           <a:lstStyle/>
           <a:p>
-            <a:endParaRPr kumimoji="1" lang="ja-JP" altLang="en-US"/>
+            <a:r>
+              <a:rPr kumimoji="1" lang="ja-JP" altLang="en-US" dirty="0" smtClean="0"/>
+              <a:t>湿度 </a:t>
+            </a:r>
+            <a:r>
+              <a:rPr kumimoji="1" lang="en-US" altLang="ja-JP" dirty="0" smtClean="0"/>
+              <a:t>(humidity)</a:t>
+            </a:r>
+            <a:endParaRPr kumimoji="1" lang="ja-JP" altLang="en-US" dirty="0" smtClean="0"/>
           </a:p>
         </p:txBody>
       </p:sp>
       <p:sp>
         <p:nvSpPr>
-          <p:cNvPr id="4" name="テキスト ボックス 3"/>
+          <p:cNvPr id="9" name="テキスト ボックス 8"/>
+          <p:cNvSpPr txBox="1"/>
+          <p:nvPr/>
+        </p:nvSpPr>
+        <p:spPr>
+          <a:xfrm>
+            <a:off x="5010267" y="3922978"/>
+            <a:ext cx="1502334" cy="369332"/>
+          </a:xfrm>
+          <a:prstGeom prst="rect">
+            <a:avLst/>
+          </a:prstGeom>
+        </p:spPr>
+        <p:style>
+          <a:lnRef idx="2">
+            <a:schemeClr val="accent1">
+              <a:shade val="50000"/>
+            </a:schemeClr>
+          </a:lnRef>
+          <a:fillRef idx="1">
+            <a:schemeClr val="accent1"/>
+          </a:fillRef>
+          <a:effectRef idx="0">
+            <a:schemeClr val="accent1"/>
+          </a:effectRef>
+          <a:fontRef idx="minor">
+            <a:schemeClr val="lt1"/>
+          </a:fontRef>
+        </p:style>
+        <p:txBody>
+          <a:bodyPr wrap="none" rtlCol="0">
+            <a:spAutoFit/>
+          </a:bodyPr>
+          <a:lstStyle/>
+          <a:p>
+            <a:r>
+              <a:rPr kumimoji="1" lang="ja-JP" altLang="en-US" dirty="0" smtClean="0"/>
+              <a:t>画像 </a:t>
+            </a:r>
+            <a:r>
+              <a:rPr kumimoji="1" lang="en-US" altLang="ja-JP" dirty="0" smtClean="0"/>
+              <a:t>(photo)</a:t>
+            </a:r>
+            <a:endParaRPr kumimoji="1" lang="ja-JP" altLang="en-US" dirty="0" smtClean="0"/>
+          </a:p>
+        </p:txBody>
+      </p:sp>
+      <p:sp>
+        <p:nvSpPr>
+          <p:cNvPr id="11" name="テキスト ボックス 10"/>
+          <p:cNvSpPr txBox="1"/>
+          <p:nvPr/>
+        </p:nvSpPr>
+        <p:spPr>
+          <a:xfrm>
+            <a:off x="838200" y="1948204"/>
+            <a:ext cx="4094391" cy="369332"/>
+          </a:xfrm>
+          <a:prstGeom prst="rect">
+            <a:avLst/>
+          </a:prstGeom>
+        </p:spPr>
+        <p:style>
+          <a:lnRef idx="2">
+            <a:schemeClr val="accent1">
+              <a:shade val="50000"/>
+            </a:schemeClr>
+          </a:lnRef>
+          <a:fillRef idx="1">
+            <a:schemeClr val="accent1"/>
+          </a:fillRef>
+          <a:effectRef idx="0">
+            <a:schemeClr val="accent1"/>
+          </a:effectRef>
+          <a:fontRef idx="minor">
+            <a:schemeClr val="lt1"/>
+          </a:fontRef>
+        </p:style>
+        <p:txBody>
+          <a:bodyPr wrap="none" rtlCol="0">
+            <a:spAutoFit/>
+          </a:bodyPr>
+          <a:lstStyle/>
+          <a:p>
+            <a:r>
+              <a:rPr kumimoji="1" lang="ja-JP" altLang="en-US" dirty="0" smtClean="0"/>
+              <a:t>サンプリング間隔 </a:t>
+            </a:r>
+            <a:r>
+              <a:rPr kumimoji="1" lang="en-US" altLang="ja-JP" dirty="0" smtClean="0"/>
+              <a:t>(sampling interval</a:t>
+            </a:r>
+            <a:r>
+              <a:rPr kumimoji="1" lang="en-US" altLang="ja-JP" dirty="0" smtClean="0"/>
+              <a:t>)</a:t>
+            </a:r>
+            <a:endParaRPr kumimoji="1" lang="ja-JP" altLang="en-US" dirty="0" smtClean="0"/>
+          </a:p>
+        </p:txBody>
+      </p:sp>
+      <p:sp>
+        <p:nvSpPr>
+          <p:cNvPr id="13" name="テキスト ボックス 12"/>
+          <p:cNvSpPr txBox="1"/>
+          <p:nvPr/>
+        </p:nvSpPr>
+        <p:spPr>
+          <a:xfrm>
+            <a:off x="2064194" y="5368486"/>
+            <a:ext cx="1904689" cy="369332"/>
+          </a:xfrm>
+          <a:prstGeom prst="rect">
+            <a:avLst/>
+          </a:prstGeom>
+        </p:spPr>
+        <p:style>
+          <a:lnRef idx="2">
+            <a:schemeClr val="accent1">
+              <a:shade val="50000"/>
+            </a:schemeClr>
+          </a:lnRef>
+          <a:fillRef idx="1">
+            <a:schemeClr val="accent1"/>
+          </a:fillRef>
+          <a:effectRef idx="0">
+            <a:schemeClr val="accent1"/>
+          </a:effectRef>
+          <a:fontRef idx="minor">
+            <a:schemeClr val="lt1"/>
+          </a:fontRef>
+        </p:style>
+        <p:txBody>
+          <a:bodyPr wrap="none" rtlCol="0">
+            <a:spAutoFit/>
+          </a:bodyPr>
+          <a:lstStyle/>
+          <a:p>
+            <a:r>
+              <a:rPr kumimoji="1" lang="ja-JP" altLang="en-US" dirty="0" smtClean="0"/>
+              <a:t>被写体 </a:t>
+            </a:r>
+            <a:r>
+              <a:rPr kumimoji="1" lang="en-US" altLang="ja-JP" dirty="0" smtClean="0"/>
+              <a:t>(subject)</a:t>
+            </a:r>
+            <a:endParaRPr kumimoji="1" lang="ja-JP" altLang="en-US" dirty="0" smtClean="0"/>
+          </a:p>
+        </p:txBody>
+      </p:sp>
+      <p:sp>
+        <p:nvSpPr>
+          <p:cNvPr id="14" name="テキスト ボックス 13"/>
+          <p:cNvSpPr txBox="1"/>
+          <p:nvPr/>
+        </p:nvSpPr>
+        <p:spPr>
+          <a:xfrm>
+            <a:off x="8177456" y="4305300"/>
+            <a:ext cx="2496196" cy="369332"/>
+          </a:xfrm>
+          <a:prstGeom prst="rect">
+            <a:avLst/>
+          </a:prstGeom>
+        </p:spPr>
+        <p:style>
+          <a:lnRef idx="2">
+            <a:schemeClr val="accent1">
+              <a:shade val="50000"/>
+            </a:schemeClr>
+          </a:lnRef>
+          <a:fillRef idx="1">
+            <a:schemeClr val="accent1"/>
+          </a:fillRef>
+          <a:effectRef idx="0">
+            <a:schemeClr val="accent1"/>
+          </a:effectRef>
+          <a:fontRef idx="minor">
+            <a:schemeClr val="lt1"/>
+          </a:fontRef>
+        </p:style>
+        <p:txBody>
+          <a:bodyPr wrap="none" rtlCol="0">
+            <a:spAutoFit/>
+          </a:bodyPr>
+          <a:lstStyle/>
+          <a:p>
+            <a:r>
+              <a:rPr kumimoji="1" lang="en-US" altLang="ja-JP" dirty="0" smtClean="0"/>
+              <a:t>Web</a:t>
+            </a:r>
+            <a:r>
+              <a:rPr kumimoji="1" lang="ja-JP" altLang="en-US" dirty="0" smtClean="0"/>
+              <a:t>サイト </a:t>
+            </a:r>
+            <a:r>
+              <a:rPr kumimoji="1" lang="en-US" altLang="ja-JP" dirty="0" smtClean="0"/>
+              <a:t>(web site)</a:t>
+            </a:r>
+            <a:endParaRPr kumimoji="1" lang="ja-JP" altLang="en-US" dirty="0" smtClean="0"/>
+          </a:p>
+        </p:txBody>
+      </p:sp>
+      <p:sp>
+        <p:nvSpPr>
+          <p:cNvPr id="15" name="テキスト ボックス 14"/>
+          <p:cNvSpPr txBox="1"/>
+          <p:nvPr/>
+        </p:nvSpPr>
+        <p:spPr>
+          <a:xfrm>
+            <a:off x="8177456" y="5183820"/>
+            <a:ext cx="1729961" cy="369332"/>
+          </a:xfrm>
+          <a:prstGeom prst="rect">
+            <a:avLst/>
+          </a:prstGeom>
+        </p:spPr>
+        <p:style>
+          <a:lnRef idx="2">
+            <a:schemeClr val="accent1">
+              <a:shade val="50000"/>
+            </a:schemeClr>
+          </a:lnRef>
+          <a:fillRef idx="1">
+            <a:schemeClr val="accent1"/>
+          </a:fillRef>
+          <a:effectRef idx="0">
+            <a:schemeClr val="accent1"/>
+          </a:effectRef>
+          <a:fontRef idx="minor">
+            <a:schemeClr val="lt1"/>
+          </a:fontRef>
+        </p:style>
+        <p:txBody>
+          <a:bodyPr wrap="none" rtlCol="0">
+            <a:spAutoFit/>
+          </a:bodyPr>
+          <a:lstStyle/>
+          <a:p>
+            <a:r>
+              <a:rPr kumimoji="1" lang="ja-JP" altLang="en-US" dirty="0" smtClean="0"/>
+              <a:t>グラフ </a:t>
+            </a:r>
+            <a:r>
+              <a:rPr kumimoji="1" lang="en-US" altLang="ja-JP" dirty="0" smtClean="0"/>
+              <a:t>(graph)</a:t>
+            </a:r>
+            <a:endParaRPr kumimoji="1" lang="ja-JP" altLang="en-US" dirty="0" smtClean="0"/>
+          </a:p>
+        </p:txBody>
+      </p:sp>
+      <p:sp>
+        <p:nvSpPr>
+          <p:cNvPr id="3" name="テキスト ボックス 2"/>
           <p:cNvSpPr txBox="1"/>
           <p:nvPr/>
         </p:nvSpPr>
@@ -14381,10 +14697,919 @@
           </a:p>
         </p:txBody>
       </p:sp>
+      <p:cxnSp>
+        <p:nvCxnSpPr>
+          <p:cNvPr id="7" name="直線コネクタ 6"/>
+          <p:cNvCxnSpPr>
+            <a:stCxn id="9" idx="1"/>
+            <a:endCxn id="2" idx="3"/>
+          </p:cNvCxnSpPr>
+          <p:nvPr/>
+        </p:nvCxnSpPr>
+        <p:spPr>
+          <a:xfrm flipH="1">
+            <a:off x="4232577" y="4107644"/>
+            <a:ext cx="777690" cy="788618"/>
+          </a:xfrm>
+          <a:prstGeom prst="line">
+            <a:avLst/>
+          </a:prstGeom>
+        </p:spPr>
+        <p:style>
+          <a:lnRef idx="1">
+            <a:schemeClr val="accent1"/>
+          </a:lnRef>
+          <a:fillRef idx="0">
+            <a:schemeClr val="accent1"/>
+          </a:fillRef>
+          <a:effectRef idx="0">
+            <a:schemeClr val="accent1"/>
+          </a:effectRef>
+          <a:fontRef idx="minor">
+            <a:schemeClr val="tx1"/>
+          </a:fontRef>
+        </p:style>
+      </p:cxnSp>
+      <p:cxnSp>
+        <p:nvCxnSpPr>
+          <p:cNvPr id="16" name="直線コネクタ 15"/>
+          <p:cNvCxnSpPr>
+            <a:stCxn id="13" idx="0"/>
+            <a:endCxn id="2" idx="2"/>
+          </p:cNvCxnSpPr>
+          <p:nvPr/>
+        </p:nvCxnSpPr>
+        <p:spPr>
+          <a:xfrm flipV="1">
+            <a:off x="3016539" y="5080928"/>
+            <a:ext cx="0" cy="287558"/>
+          </a:xfrm>
+          <a:prstGeom prst="line">
+            <a:avLst/>
+          </a:prstGeom>
+        </p:spPr>
+        <p:style>
+          <a:lnRef idx="1">
+            <a:schemeClr val="accent1"/>
+          </a:lnRef>
+          <a:fillRef idx="0">
+            <a:schemeClr val="accent1"/>
+          </a:fillRef>
+          <a:effectRef idx="0">
+            <a:schemeClr val="accent1"/>
+          </a:effectRef>
+          <a:fontRef idx="minor">
+            <a:schemeClr val="tx1"/>
+          </a:fontRef>
+        </p:style>
+      </p:cxnSp>
+      <p:sp>
+        <p:nvSpPr>
+          <p:cNvPr id="21" name="テキスト ボックス 20"/>
+          <p:cNvSpPr txBox="1"/>
+          <p:nvPr/>
+        </p:nvSpPr>
+        <p:spPr>
+          <a:xfrm>
+            <a:off x="7348258" y="3191429"/>
+            <a:ext cx="1726755" cy="369332"/>
+          </a:xfrm>
+          <a:prstGeom prst="rect">
+            <a:avLst/>
+          </a:prstGeom>
+        </p:spPr>
+        <p:style>
+          <a:lnRef idx="2">
+            <a:schemeClr val="accent1">
+              <a:shade val="50000"/>
+            </a:schemeClr>
+          </a:lnRef>
+          <a:fillRef idx="1">
+            <a:schemeClr val="accent1"/>
+          </a:fillRef>
+          <a:effectRef idx="0">
+            <a:schemeClr val="accent1"/>
+          </a:effectRef>
+          <a:fontRef idx="minor">
+            <a:schemeClr val="lt1"/>
+          </a:fontRef>
+        </p:style>
+        <p:txBody>
+          <a:bodyPr wrap="none" rtlCol="0">
+            <a:spAutoFit/>
+          </a:bodyPr>
+          <a:lstStyle/>
+          <a:p>
+            <a:r>
+              <a:rPr kumimoji="1" lang="ja-JP" altLang="en-US" dirty="0" smtClean="0"/>
+              <a:t>送信 </a:t>
+            </a:r>
+            <a:r>
+              <a:rPr kumimoji="1" lang="en-US" altLang="ja-JP" dirty="0" smtClean="0"/>
+              <a:t>(sending)</a:t>
+            </a:r>
+            <a:endParaRPr kumimoji="1" lang="ja-JP" altLang="en-US" dirty="0" smtClean="0"/>
+          </a:p>
+        </p:txBody>
+      </p:sp>
+      <p:cxnSp>
+        <p:nvCxnSpPr>
+          <p:cNvPr id="23" name="直線コネクタ 22"/>
+          <p:cNvCxnSpPr>
+            <a:stCxn id="73" idx="0"/>
+            <a:endCxn id="11" idx="2"/>
+          </p:cNvCxnSpPr>
+          <p:nvPr/>
+        </p:nvCxnSpPr>
+        <p:spPr>
+          <a:xfrm flipV="1">
+            <a:off x="2885395" y="2317536"/>
+            <a:ext cx="1" cy="644496"/>
+          </a:xfrm>
+          <a:prstGeom prst="line">
+            <a:avLst/>
+          </a:prstGeom>
+        </p:spPr>
+        <p:style>
+          <a:lnRef idx="1">
+            <a:schemeClr val="accent1"/>
+          </a:lnRef>
+          <a:fillRef idx="0">
+            <a:schemeClr val="accent1"/>
+          </a:fillRef>
+          <a:effectRef idx="0">
+            <a:schemeClr val="accent1"/>
+          </a:effectRef>
+          <a:fontRef idx="minor">
+            <a:schemeClr val="tx1"/>
+          </a:fontRef>
+        </p:style>
+      </p:cxnSp>
+      <p:cxnSp>
+        <p:nvCxnSpPr>
+          <p:cNvPr id="25" name="直線コネクタ 24"/>
+          <p:cNvCxnSpPr>
+            <a:stCxn id="21" idx="1"/>
+            <a:endCxn id="5" idx="3"/>
+          </p:cNvCxnSpPr>
+          <p:nvPr/>
+        </p:nvCxnSpPr>
+        <p:spPr>
+          <a:xfrm flipH="1" flipV="1">
+            <a:off x="6862858" y="2935162"/>
+            <a:ext cx="485400" cy="440933"/>
+          </a:xfrm>
+          <a:prstGeom prst="line">
+            <a:avLst/>
+          </a:prstGeom>
+        </p:spPr>
+        <p:style>
+          <a:lnRef idx="1">
+            <a:schemeClr val="accent1"/>
+          </a:lnRef>
+          <a:fillRef idx="0">
+            <a:schemeClr val="accent1"/>
+          </a:fillRef>
+          <a:effectRef idx="0">
+            <a:schemeClr val="accent1"/>
+          </a:effectRef>
+          <a:fontRef idx="minor">
+            <a:schemeClr val="tx1"/>
+          </a:fontRef>
+        </p:style>
+      </p:cxnSp>
+      <p:cxnSp>
+        <p:nvCxnSpPr>
+          <p:cNvPr id="33" name="直線コネクタ 32"/>
+          <p:cNvCxnSpPr>
+            <a:stCxn id="21" idx="1"/>
+            <a:endCxn id="8" idx="3"/>
+          </p:cNvCxnSpPr>
+          <p:nvPr/>
+        </p:nvCxnSpPr>
+        <p:spPr>
+          <a:xfrm flipH="1">
+            <a:off x="6563388" y="3376095"/>
+            <a:ext cx="784870" cy="205156"/>
+          </a:xfrm>
+          <a:prstGeom prst="line">
+            <a:avLst/>
+          </a:prstGeom>
+        </p:spPr>
+        <p:style>
+          <a:lnRef idx="1">
+            <a:schemeClr val="accent1"/>
+          </a:lnRef>
+          <a:fillRef idx="0">
+            <a:schemeClr val="accent1"/>
+          </a:fillRef>
+          <a:effectRef idx="0">
+            <a:schemeClr val="accent1"/>
+          </a:effectRef>
+          <a:fontRef idx="minor">
+            <a:schemeClr val="tx1"/>
+          </a:fontRef>
+        </p:style>
+      </p:cxnSp>
+      <p:cxnSp>
+        <p:nvCxnSpPr>
+          <p:cNvPr id="37" name="直線コネクタ 36"/>
+          <p:cNvCxnSpPr>
+            <a:stCxn id="21" idx="1"/>
+            <a:endCxn id="9" idx="3"/>
+          </p:cNvCxnSpPr>
+          <p:nvPr/>
+        </p:nvCxnSpPr>
+        <p:spPr>
+          <a:xfrm flipH="1">
+            <a:off x="6512601" y="3376095"/>
+            <a:ext cx="835657" cy="731549"/>
+          </a:xfrm>
+          <a:prstGeom prst="line">
+            <a:avLst/>
+          </a:prstGeom>
+        </p:spPr>
+        <p:style>
+          <a:lnRef idx="1">
+            <a:schemeClr val="accent1"/>
+          </a:lnRef>
+          <a:fillRef idx="0">
+            <a:schemeClr val="accent1"/>
+          </a:fillRef>
+          <a:effectRef idx="0">
+            <a:schemeClr val="accent1"/>
+          </a:effectRef>
+          <a:fontRef idx="minor">
+            <a:schemeClr val="tx1"/>
+          </a:fontRef>
+        </p:style>
+      </p:cxnSp>
+      <p:cxnSp>
+        <p:nvCxnSpPr>
+          <p:cNvPr id="52" name="直線コネクタ 51"/>
+          <p:cNvCxnSpPr>
+            <a:stCxn id="2" idx="0"/>
+            <a:endCxn id="38" idx="2"/>
+          </p:cNvCxnSpPr>
+          <p:nvPr/>
+        </p:nvCxnSpPr>
+        <p:spPr>
+          <a:xfrm flipH="1" flipV="1">
+            <a:off x="1853981" y="3999984"/>
+            <a:ext cx="1162558" cy="711612"/>
+          </a:xfrm>
+          <a:prstGeom prst="line">
+            <a:avLst/>
+          </a:prstGeom>
+        </p:spPr>
+        <p:style>
+          <a:lnRef idx="1">
+            <a:schemeClr val="accent1"/>
+          </a:lnRef>
+          <a:fillRef idx="0">
+            <a:schemeClr val="accent1"/>
+          </a:fillRef>
+          <a:effectRef idx="0">
+            <a:schemeClr val="accent1"/>
+          </a:effectRef>
+          <a:fontRef idx="minor">
+            <a:schemeClr val="tx1"/>
+          </a:fontRef>
+        </p:style>
+      </p:cxnSp>
+      <p:cxnSp>
+        <p:nvCxnSpPr>
+          <p:cNvPr id="69" name="直線コネクタ 68"/>
+          <p:cNvCxnSpPr>
+            <a:stCxn id="14" idx="2"/>
+            <a:endCxn id="15" idx="0"/>
+          </p:cNvCxnSpPr>
+          <p:nvPr/>
+        </p:nvCxnSpPr>
+        <p:spPr>
+          <a:xfrm flipH="1">
+            <a:off x="9042437" y="4674632"/>
+            <a:ext cx="383117" cy="509188"/>
+          </a:xfrm>
+          <a:prstGeom prst="line">
+            <a:avLst/>
+          </a:prstGeom>
+        </p:spPr>
+        <p:style>
+          <a:lnRef idx="1">
+            <a:schemeClr val="accent1"/>
+          </a:lnRef>
+          <a:fillRef idx="0">
+            <a:schemeClr val="accent1"/>
+          </a:fillRef>
+          <a:effectRef idx="0">
+            <a:schemeClr val="accent1"/>
+          </a:effectRef>
+          <a:fontRef idx="minor">
+            <a:schemeClr val="tx1"/>
+          </a:fontRef>
+        </p:style>
+      </p:cxnSp>
+      <p:sp>
+        <p:nvSpPr>
+          <p:cNvPr id="73" name="テキスト ボックス 72"/>
+          <p:cNvSpPr txBox="1"/>
+          <p:nvPr/>
+        </p:nvSpPr>
+        <p:spPr>
+          <a:xfrm>
+            <a:off x="1683784" y="2962032"/>
+            <a:ext cx="2403222" cy="369332"/>
+          </a:xfrm>
+          <a:prstGeom prst="rect">
+            <a:avLst/>
+          </a:prstGeom>
+        </p:spPr>
+        <p:style>
+          <a:lnRef idx="2">
+            <a:schemeClr val="accent1">
+              <a:shade val="50000"/>
+            </a:schemeClr>
+          </a:lnRef>
+          <a:fillRef idx="1">
+            <a:schemeClr val="accent1"/>
+          </a:fillRef>
+          <a:effectRef idx="0">
+            <a:schemeClr val="accent1"/>
+          </a:effectRef>
+          <a:fontRef idx="minor">
+            <a:schemeClr val="lt1"/>
+          </a:fontRef>
+        </p:style>
+        <p:txBody>
+          <a:bodyPr wrap="none" rtlCol="0">
+            <a:spAutoFit/>
+          </a:bodyPr>
+          <a:lstStyle/>
+          <a:p>
+            <a:r>
+              <a:rPr kumimoji="1" lang="ja-JP" altLang="en-US" dirty="0" smtClean="0"/>
+              <a:t>センシング </a:t>
+            </a:r>
+            <a:r>
+              <a:rPr kumimoji="1" lang="en-US" altLang="ja-JP" dirty="0" smtClean="0"/>
+              <a:t>(</a:t>
+            </a:r>
+            <a:r>
+              <a:rPr kumimoji="1" lang="en-US" altLang="ja-JP" dirty="0" smtClean="0"/>
+              <a:t>sensing</a:t>
+            </a:r>
+            <a:r>
+              <a:rPr kumimoji="1" lang="en-US" altLang="ja-JP" dirty="0" smtClean="0"/>
+              <a:t>)</a:t>
+            </a:r>
+            <a:endParaRPr kumimoji="1" lang="ja-JP" altLang="en-US" dirty="0" smtClean="0"/>
+          </a:p>
+        </p:txBody>
+      </p:sp>
+      <p:cxnSp>
+        <p:nvCxnSpPr>
+          <p:cNvPr id="74" name="直線コネクタ 73"/>
+          <p:cNvCxnSpPr>
+            <a:stCxn id="5" idx="1"/>
+            <a:endCxn id="73" idx="3"/>
+          </p:cNvCxnSpPr>
+          <p:nvPr/>
+        </p:nvCxnSpPr>
+        <p:spPr>
+          <a:xfrm flipH="1">
+            <a:off x="4087006" y="2935162"/>
+            <a:ext cx="573005" cy="211536"/>
+          </a:xfrm>
+          <a:prstGeom prst="line">
+            <a:avLst/>
+          </a:prstGeom>
+        </p:spPr>
+        <p:style>
+          <a:lnRef idx="1">
+            <a:schemeClr val="accent1"/>
+          </a:lnRef>
+          <a:fillRef idx="0">
+            <a:schemeClr val="accent1"/>
+          </a:fillRef>
+          <a:effectRef idx="0">
+            <a:schemeClr val="accent1"/>
+          </a:effectRef>
+          <a:fontRef idx="minor">
+            <a:schemeClr val="tx1"/>
+          </a:fontRef>
+        </p:style>
+      </p:cxnSp>
+      <p:cxnSp>
+        <p:nvCxnSpPr>
+          <p:cNvPr id="82" name="直線コネクタ 81"/>
+          <p:cNvCxnSpPr>
+            <a:stCxn id="8" idx="1"/>
+            <a:endCxn id="73" idx="3"/>
+          </p:cNvCxnSpPr>
+          <p:nvPr/>
+        </p:nvCxnSpPr>
+        <p:spPr>
+          <a:xfrm flipH="1" flipV="1">
+            <a:off x="4087006" y="3146698"/>
+            <a:ext cx="666271" cy="434553"/>
+          </a:xfrm>
+          <a:prstGeom prst="line">
+            <a:avLst/>
+          </a:prstGeom>
+        </p:spPr>
+        <p:style>
+          <a:lnRef idx="1">
+            <a:schemeClr val="accent1"/>
+          </a:lnRef>
+          <a:fillRef idx="0">
+            <a:schemeClr val="accent1"/>
+          </a:fillRef>
+          <a:effectRef idx="0">
+            <a:schemeClr val="accent1"/>
+          </a:effectRef>
+          <a:fontRef idx="minor">
+            <a:schemeClr val="tx1"/>
+          </a:fontRef>
+        </p:style>
+      </p:cxnSp>
+      <p:sp>
+        <p:nvSpPr>
+          <p:cNvPr id="87" name="テキスト ボックス 86"/>
+          <p:cNvSpPr txBox="1"/>
+          <p:nvPr/>
+        </p:nvSpPr>
+        <p:spPr>
+          <a:xfrm>
+            <a:off x="8353322" y="5945344"/>
+            <a:ext cx="2484976" cy="369332"/>
+          </a:xfrm>
+          <a:prstGeom prst="rect">
+            <a:avLst/>
+          </a:prstGeom>
+        </p:spPr>
+        <p:style>
+          <a:lnRef idx="2">
+            <a:schemeClr val="accent1">
+              <a:shade val="50000"/>
+            </a:schemeClr>
+          </a:lnRef>
+          <a:fillRef idx="1">
+            <a:schemeClr val="accent1"/>
+          </a:fillRef>
+          <a:effectRef idx="0">
+            <a:schemeClr val="accent1"/>
+          </a:effectRef>
+          <a:fontRef idx="minor">
+            <a:schemeClr val="lt1"/>
+          </a:fontRef>
+        </p:style>
+        <p:txBody>
+          <a:bodyPr wrap="none" rtlCol="0">
+            <a:spAutoFit/>
+          </a:bodyPr>
+          <a:lstStyle/>
+          <a:p>
+            <a:r>
+              <a:rPr kumimoji="1" lang="ja-JP" altLang="en-US" dirty="0" smtClean="0"/>
+              <a:t>撮影日時 </a:t>
+            </a:r>
+            <a:r>
+              <a:rPr kumimoji="1" lang="en-US" altLang="ja-JP" dirty="0" smtClean="0"/>
+              <a:t>(date taken)</a:t>
+            </a:r>
+            <a:endParaRPr kumimoji="1" lang="ja-JP" altLang="en-US" dirty="0" smtClean="0"/>
+          </a:p>
+        </p:txBody>
+      </p:sp>
+      <p:cxnSp>
+        <p:nvCxnSpPr>
+          <p:cNvPr id="88" name="直線コネクタ 87"/>
+          <p:cNvCxnSpPr>
+            <a:stCxn id="15" idx="2"/>
+            <a:endCxn id="87" idx="0"/>
+          </p:cNvCxnSpPr>
+          <p:nvPr/>
+        </p:nvCxnSpPr>
+        <p:spPr>
+          <a:xfrm>
+            <a:off x="9042437" y="5553152"/>
+            <a:ext cx="553373" cy="392192"/>
+          </a:xfrm>
+          <a:prstGeom prst="line">
+            <a:avLst/>
+          </a:prstGeom>
+        </p:spPr>
+        <p:style>
+          <a:lnRef idx="1">
+            <a:schemeClr val="accent1"/>
+          </a:lnRef>
+          <a:fillRef idx="0">
+            <a:schemeClr val="accent1"/>
+          </a:fillRef>
+          <a:effectRef idx="0">
+            <a:schemeClr val="accent1"/>
+          </a:effectRef>
+          <a:fontRef idx="minor">
+            <a:schemeClr val="tx1"/>
+          </a:fontRef>
+        </p:style>
+      </p:cxnSp>
+      <p:sp>
+        <p:nvSpPr>
+          <p:cNvPr id="98" name="テキスト ボックス 97"/>
+          <p:cNvSpPr txBox="1"/>
+          <p:nvPr/>
+        </p:nvSpPr>
+        <p:spPr>
+          <a:xfrm>
+            <a:off x="8860524" y="997369"/>
+            <a:ext cx="1879041" cy="369332"/>
+          </a:xfrm>
+          <a:prstGeom prst="rect">
+            <a:avLst/>
+          </a:prstGeom>
+        </p:spPr>
+        <p:style>
+          <a:lnRef idx="2">
+            <a:schemeClr val="accent1">
+              <a:shade val="50000"/>
+            </a:schemeClr>
+          </a:lnRef>
+          <a:fillRef idx="1">
+            <a:schemeClr val="accent1"/>
+          </a:fillRef>
+          <a:effectRef idx="0">
+            <a:schemeClr val="accent1"/>
+          </a:effectRef>
+          <a:fontRef idx="minor">
+            <a:schemeClr val="lt1"/>
+          </a:fontRef>
+        </p:style>
+        <p:txBody>
+          <a:bodyPr wrap="none" rtlCol="0">
+            <a:spAutoFit/>
+          </a:bodyPr>
+          <a:lstStyle/>
+          <a:p>
+            <a:r>
+              <a:rPr kumimoji="1" lang="ja-JP" altLang="en-US" dirty="0" smtClean="0"/>
+              <a:t>トピック </a:t>
+            </a:r>
+            <a:r>
+              <a:rPr kumimoji="1" lang="en-US" altLang="ja-JP" dirty="0" smtClean="0"/>
+              <a:t>(topic)</a:t>
+            </a:r>
+            <a:endParaRPr kumimoji="1" lang="ja-JP" altLang="en-US" dirty="0" smtClean="0"/>
+          </a:p>
+        </p:txBody>
+      </p:sp>
+      <p:sp>
+        <p:nvSpPr>
+          <p:cNvPr id="99" name="テキスト ボックス 98"/>
+          <p:cNvSpPr txBox="1"/>
+          <p:nvPr/>
+        </p:nvSpPr>
+        <p:spPr>
+          <a:xfrm>
+            <a:off x="8860523" y="1486567"/>
+            <a:ext cx="1787669" cy="369332"/>
+          </a:xfrm>
+          <a:prstGeom prst="rect">
+            <a:avLst/>
+          </a:prstGeom>
+        </p:spPr>
+        <p:style>
+          <a:lnRef idx="2">
+            <a:schemeClr val="accent1">
+              <a:shade val="50000"/>
+            </a:schemeClr>
+          </a:lnRef>
+          <a:fillRef idx="1">
+            <a:schemeClr val="accent1"/>
+          </a:fillRef>
+          <a:effectRef idx="0">
+            <a:schemeClr val="accent1"/>
+          </a:effectRef>
+          <a:fontRef idx="minor">
+            <a:schemeClr val="lt1"/>
+          </a:fontRef>
+        </p:style>
+        <p:txBody>
+          <a:bodyPr wrap="none" rtlCol="0">
+            <a:spAutoFit/>
+          </a:bodyPr>
+          <a:lstStyle/>
+          <a:p>
+            <a:r>
+              <a:rPr lang="en-US" altLang="ja-JP" dirty="0" err="1"/>
+              <a:t>clientEndpoint</a:t>
+            </a:r>
+            <a:r>
+              <a:rPr lang="en-US" altLang="ja-JP" dirty="0"/>
+              <a:t> </a:t>
+            </a:r>
+            <a:endParaRPr kumimoji="1" lang="ja-JP" altLang="en-US" dirty="0" smtClean="0"/>
+          </a:p>
+        </p:txBody>
+      </p:sp>
+      <p:sp>
+        <p:nvSpPr>
+          <p:cNvPr id="101" name="テキスト ボックス 100"/>
+          <p:cNvSpPr txBox="1"/>
+          <p:nvPr/>
+        </p:nvSpPr>
+        <p:spPr>
+          <a:xfrm>
+            <a:off x="8860524" y="1975673"/>
+            <a:ext cx="970137" cy="369332"/>
+          </a:xfrm>
+          <a:prstGeom prst="rect">
+            <a:avLst/>
+          </a:prstGeom>
+        </p:spPr>
+        <p:style>
+          <a:lnRef idx="2">
+            <a:schemeClr val="accent1">
+              <a:shade val="50000"/>
+            </a:schemeClr>
+          </a:lnRef>
+          <a:fillRef idx="1">
+            <a:schemeClr val="accent1"/>
+          </a:fillRef>
+          <a:effectRef idx="0">
+            <a:schemeClr val="accent1"/>
+          </a:effectRef>
+          <a:fontRef idx="minor">
+            <a:schemeClr val="lt1"/>
+          </a:fontRef>
+        </p:style>
+        <p:txBody>
+          <a:bodyPr wrap="none" rtlCol="0">
+            <a:spAutoFit/>
+          </a:bodyPr>
+          <a:lstStyle/>
+          <a:p>
+            <a:r>
+              <a:rPr lang="en-US" altLang="ja-JP" dirty="0" err="1" smtClean="0"/>
+              <a:t>clientId</a:t>
+            </a:r>
+            <a:endParaRPr kumimoji="1" lang="ja-JP" altLang="en-US" dirty="0" smtClean="0"/>
+          </a:p>
+        </p:txBody>
+      </p:sp>
+      <p:sp>
+        <p:nvSpPr>
+          <p:cNvPr id="103" name="テキスト ボックス 102"/>
+          <p:cNvSpPr txBox="1"/>
+          <p:nvPr/>
+        </p:nvSpPr>
+        <p:spPr>
+          <a:xfrm>
+            <a:off x="9916262" y="1969666"/>
+            <a:ext cx="1646605" cy="369332"/>
+          </a:xfrm>
+          <a:prstGeom prst="rect">
+            <a:avLst/>
+          </a:prstGeom>
+        </p:spPr>
+        <p:style>
+          <a:lnRef idx="2">
+            <a:schemeClr val="accent1">
+              <a:shade val="50000"/>
+            </a:schemeClr>
+          </a:lnRef>
+          <a:fillRef idx="1">
+            <a:schemeClr val="accent1"/>
+          </a:fillRef>
+          <a:effectRef idx="0">
+            <a:schemeClr val="accent1"/>
+          </a:effectRef>
+          <a:fontRef idx="minor">
+            <a:schemeClr val="lt1"/>
+          </a:fontRef>
+        </p:style>
+        <p:txBody>
+          <a:bodyPr wrap="none" rtlCol="0">
+            <a:spAutoFit/>
+          </a:bodyPr>
+          <a:lstStyle/>
+          <a:p>
+            <a:r>
+              <a:rPr lang="en-US" altLang="ja-JP" dirty="0" err="1" smtClean="0"/>
+              <a:t>certificateFile</a:t>
+            </a:r>
+            <a:endParaRPr kumimoji="1" lang="ja-JP" altLang="en-US" dirty="0" smtClean="0"/>
+          </a:p>
+        </p:txBody>
+      </p:sp>
+      <p:sp>
+        <p:nvSpPr>
+          <p:cNvPr id="105" name="テキスト ボックス 104"/>
+          <p:cNvSpPr txBox="1"/>
+          <p:nvPr/>
+        </p:nvSpPr>
+        <p:spPr>
+          <a:xfrm>
+            <a:off x="8860523" y="2464588"/>
+            <a:ext cx="1773242" cy="369332"/>
+          </a:xfrm>
+          <a:prstGeom prst="rect">
+            <a:avLst/>
+          </a:prstGeom>
+        </p:spPr>
+        <p:style>
+          <a:lnRef idx="2">
+            <a:schemeClr val="accent1">
+              <a:shade val="50000"/>
+            </a:schemeClr>
+          </a:lnRef>
+          <a:fillRef idx="1">
+            <a:schemeClr val="accent1"/>
+          </a:fillRef>
+          <a:effectRef idx="0">
+            <a:schemeClr val="accent1"/>
+          </a:effectRef>
+          <a:fontRef idx="minor">
+            <a:schemeClr val="lt1"/>
+          </a:fontRef>
+        </p:style>
+        <p:txBody>
+          <a:bodyPr wrap="none" rtlCol="0">
+            <a:spAutoFit/>
+          </a:bodyPr>
+          <a:lstStyle/>
+          <a:p>
+            <a:r>
+              <a:rPr lang="en-US" altLang="ja-JP" dirty="0" err="1" smtClean="0"/>
+              <a:t>privateKeyFile</a:t>
+            </a:r>
+            <a:endParaRPr kumimoji="1" lang="ja-JP" altLang="en-US" dirty="0" smtClean="0"/>
+          </a:p>
+        </p:txBody>
+      </p:sp>
+      <p:sp>
+        <p:nvSpPr>
+          <p:cNvPr id="107" name="角丸四角形 106"/>
+          <p:cNvSpPr/>
+          <p:nvPr/>
+        </p:nvSpPr>
+        <p:spPr>
+          <a:xfrm>
+            <a:off x="8724900" y="868680"/>
+            <a:ext cx="2971800" cy="2066482"/>
+          </a:xfrm>
+          <a:prstGeom prst="roundRect">
+            <a:avLst>
+              <a:gd name="adj" fmla="val 7080"/>
+            </a:avLst>
+          </a:prstGeom>
+          <a:noFill/>
+        </p:spPr>
+        <p:style>
+          <a:lnRef idx="2">
+            <a:schemeClr val="accent1">
+              <a:shade val="50000"/>
+            </a:schemeClr>
+          </a:lnRef>
+          <a:fillRef idx="1">
+            <a:schemeClr val="accent1"/>
+          </a:fillRef>
+          <a:effectRef idx="0">
+            <a:schemeClr val="accent1"/>
+          </a:effectRef>
+          <a:fontRef idx="minor">
+            <a:schemeClr val="lt1"/>
+          </a:fontRef>
+        </p:style>
+        <p:txBody>
+          <a:bodyPr rtlCol="0" anchor="ctr"/>
+          <a:lstStyle/>
+          <a:p>
+            <a:pPr algn="ctr"/>
+            <a:endParaRPr kumimoji="1" lang="ja-JP" altLang="en-US" sz="800" dirty="0" smtClean="0"/>
+          </a:p>
+        </p:txBody>
+      </p:sp>
+      <p:cxnSp>
+        <p:nvCxnSpPr>
+          <p:cNvPr id="109" name="直線コネクタ 108"/>
+          <p:cNvCxnSpPr>
+            <a:stCxn id="107" idx="2"/>
+            <a:endCxn id="21" idx="3"/>
+          </p:cNvCxnSpPr>
+          <p:nvPr/>
+        </p:nvCxnSpPr>
+        <p:spPr>
+          <a:xfrm flipH="1">
+            <a:off x="9075013" y="2935162"/>
+            <a:ext cx="1135787" cy="440933"/>
+          </a:xfrm>
+          <a:prstGeom prst="line">
+            <a:avLst/>
+          </a:prstGeom>
+        </p:spPr>
+        <p:style>
+          <a:lnRef idx="1">
+            <a:schemeClr val="accent1"/>
+          </a:lnRef>
+          <a:fillRef idx="0">
+            <a:schemeClr val="accent1"/>
+          </a:fillRef>
+          <a:effectRef idx="0">
+            <a:schemeClr val="accent1"/>
+          </a:effectRef>
+          <a:fontRef idx="minor">
+            <a:schemeClr val="tx1"/>
+          </a:fontRef>
+        </p:style>
+      </p:cxnSp>
+      <p:sp>
+        <p:nvSpPr>
+          <p:cNvPr id="38" name="テキスト ボックス 37"/>
+          <p:cNvSpPr txBox="1"/>
+          <p:nvPr/>
+        </p:nvSpPr>
+        <p:spPr>
+          <a:xfrm>
+            <a:off x="465620" y="3630652"/>
+            <a:ext cx="2776722" cy="369332"/>
+          </a:xfrm>
+          <a:prstGeom prst="rect">
+            <a:avLst/>
+          </a:prstGeom>
+        </p:spPr>
+        <p:style>
+          <a:lnRef idx="2">
+            <a:schemeClr val="accent1">
+              <a:shade val="50000"/>
+            </a:schemeClr>
+          </a:lnRef>
+          <a:fillRef idx="1">
+            <a:schemeClr val="accent1"/>
+          </a:fillRef>
+          <a:effectRef idx="0">
+            <a:schemeClr val="accent1"/>
+          </a:effectRef>
+          <a:fontRef idx="minor">
+            <a:schemeClr val="lt1"/>
+          </a:fontRef>
+        </p:style>
+        <p:txBody>
+          <a:bodyPr wrap="none" rtlCol="0">
+            <a:spAutoFit/>
+          </a:bodyPr>
+          <a:lstStyle/>
+          <a:p>
+            <a:r>
+              <a:rPr kumimoji="1" lang="ja-JP" altLang="en-US" dirty="0" smtClean="0"/>
+              <a:t>サンプリング </a:t>
+            </a:r>
+            <a:r>
+              <a:rPr kumimoji="1" lang="en-US" altLang="ja-JP" dirty="0" smtClean="0"/>
+              <a:t>(sampling)</a:t>
+            </a:r>
+            <a:endParaRPr kumimoji="1" lang="ja-JP" altLang="en-US" dirty="0" smtClean="0"/>
+          </a:p>
+        </p:txBody>
+      </p:sp>
+      <p:cxnSp>
+        <p:nvCxnSpPr>
+          <p:cNvPr id="43" name="直線コネクタ 42"/>
+          <p:cNvCxnSpPr>
+            <a:stCxn id="73" idx="2"/>
+            <a:endCxn id="38" idx="0"/>
+          </p:cNvCxnSpPr>
+          <p:nvPr/>
+        </p:nvCxnSpPr>
+        <p:spPr>
+          <a:xfrm flipH="1">
+            <a:off x="1853981" y="3331364"/>
+            <a:ext cx="1031414" cy="299288"/>
+          </a:xfrm>
+          <a:prstGeom prst="line">
+            <a:avLst/>
+          </a:prstGeom>
+        </p:spPr>
+        <p:style>
+          <a:lnRef idx="1">
+            <a:schemeClr val="accent1"/>
+          </a:lnRef>
+          <a:fillRef idx="0">
+            <a:schemeClr val="accent1"/>
+          </a:fillRef>
+          <a:effectRef idx="0">
+            <a:schemeClr val="accent1"/>
+          </a:effectRef>
+          <a:fontRef idx="minor">
+            <a:schemeClr val="tx1"/>
+          </a:fontRef>
+        </p:style>
+      </p:cxnSp>
     </p:spTree>
     <p:extLst>
       <p:ext uri="{BB962C8B-B14F-4D97-AF65-F5344CB8AC3E}">
-        <p14:creationId xmlns:p14="http://schemas.microsoft.com/office/powerpoint/2010/main" val="3910883696"/>
+        <p14:creationId xmlns:p14="http://schemas.microsoft.com/office/powerpoint/2010/main" val="2547286906"/>
       </p:ext>
     </p:extLst>
   </p:cSld>

</xml_diff>

<commit_message>
feature: Return response message indicating Raspberry service status.
</commit_message>
<xml_diff>
--- a/WakameWatcher.pptx
+++ b/WakameWatcher.pptx
@@ -228,7 +228,7 @@
           <a:p>
             <a:fld id="{2061DEDF-9378-4693-8222-65C54ECDF59A}" type="datetimeFigureOut">
               <a:rPr kumimoji="1" lang="ja-JP" altLang="en-US" smtClean="0"/>
-              <a:t>2018/10/7</a:t>
+              <a:t>2018/10/8</a:t>
             </a:fld>
             <a:endParaRPr kumimoji="1" lang="ja-JP" altLang="en-US"/>
           </a:p>
@@ -864,7 +864,7 @@
           <a:p>
             <a:fld id="{5AB1C2F8-01C6-2A43-BFDE-0E7A8C3DAD71}" type="datetimeFigureOut">
               <a:rPr kumimoji="1" lang="ja-JP" altLang="en-US" smtClean="0"/>
-              <a:t>2018/10/7</a:t>
+              <a:t>2018/10/8</a:t>
             </a:fld>
             <a:endParaRPr kumimoji="1" lang="ja-JP" altLang="en-US"/>
           </a:p>
@@ -1064,7 +1064,7 @@
           <a:p>
             <a:fld id="{5AB1C2F8-01C6-2A43-BFDE-0E7A8C3DAD71}" type="datetimeFigureOut">
               <a:rPr kumimoji="1" lang="ja-JP" altLang="en-US" smtClean="0"/>
-              <a:t>2018/10/7</a:t>
+              <a:t>2018/10/8</a:t>
             </a:fld>
             <a:endParaRPr kumimoji="1" lang="ja-JP" altLang="en-US"/>
           </a:p>
@@ -1274,7 +1274,7 @@
           <a:p>
             <a:fld id="{5AB1C2F8-01C6-2A43-BFDE-0E7A8C3DAD71}" type="datetimeFigureOut">
               <a:rPr kumimoji="1" lang="ja-JP" altLang="en-US" smtClean="0"/>
-              <a:t>2018/10/7</a:t>
+              <a:t>2018/10/8</a:t>
             </a:fld>
             <a:endParaRPr kumimoji="1" lang="ja-JP" altLang="en-US"/>
           </a:p>
@@ -1508,7 +1508,7 @@
           <a:p>
             <a:fld id="{5AB1C2F8-01C6-2A43-BFDE-0E7A8C3DAD71}" type="datetimeFigureOut">
               <a:rPr kumimoji="1" lang="ja-JP" altLang="en-US" smtClean="0"/>
-              <a:t>2018/10/7</a:t>
+              <a:t>2018/10/8</a:t>
             </a:fld>
             <a:endParaRPr kumimoji="1" lang="ja-JP" altLang="en-US"/>
           </a:p>
@@ -1753,7 +1753,7 @@
           <a:p>
             <a:fld id="{5AB1C2F8-01C6-2A43-BFDE-0E7A8C3DAD71}" type="datetimeFigureOut">
               <a:rPr kumimoji="1" lang="ja-JP" altLang="en-US" smtClean="0"/>
-              <a:t>2018/10/7</a:t>
+              <a:t>2018/10/8</a:t>
             </a:fld>
             <a:endParaRPr kumimoji="1" lang="ja-JP" altLang="en-US"/>
           </a:p>
@@ -2046,7 +2046,7 @@
           <a:p>
             <a:fld id="{5AB1C2F8-01C6-2A43-BFDE-0E7A8C3DAD71}" type="datetimeFigureOut">
               <a:rPr kumimoji="1" lang="ja-JP" altLang="en-US" smtClean="0"/>
-              <a:t>2018/10/7</a:t>
+              <a:t>2018/10/8</a:t>
             </a:fld>
             <a:endParaRPr kumimoji="1" lang="ja-JP" altLang="en-US"/>
           </a:p>
@@ -2474,7 +2474,7 @@
           <a:p>
             <a:fld id="{5AB1C2F8-01C6-2A43-BFDE-0E7A8C3DAD71}" type="datetimeFigureOut">
               <a:rPr kumimoji="1" lang="ja-JP" altLang="en-US" smtClean="0"/>
-              <a:t>2018/10/7</a:t>
+              <a:t>2018/10/8</a:t>
             </a:fld>
             <a:endParaRPr kumimoji="1" lang="ja-JP" altLang="en-US"/>
           </a:p>
@@ -2591,7 +2591,7 @@
           <a:p>
             <a:fld id="{5AB1C2F8-01C6-2A43-BFDE-0E7A8C3DAD71}" type="datetimeFigureOut">
               <a:rPr kumimoji="1" lang="ja-JP" altLang="en-US" smtClean="0"/>
-              <a:t>2018/10/7</a:t>
+              <a:t>2018/10/8</a:t>
             </a:fld>
             <a:endParaRPr kumimoji="1" lang="ja-JP" altLang="en-US"/>
           </a:p>
@@ -2686,7 +2686,7 @@
           <a:p>
             <a:fld id="{5AB1C2F8-01C6-2A43-BFDE-0E7A8C3DAD71}" type="datetimeFigureOut">
               <a:rPr kumimoji="1" lang="ja-JP" altLang="en-US" smtClean="0"/>
-              <a:t>2018/10/7</a:t>
+              <a:t>2018/10/8</a:t>
             </a:fld>
             <a:endParaRPr kumimoji="1" lang="ja-JP" altLang="en-US"/>
           </a:p>
@@ -2993,7 +2993,7 @@
           <a:p>
             <a:fld id="{5AB1C2F8-01C6-2A43-BFDE-0E7A8C3DAD71}" type="datetimeFigureOut">
               <a:rPr kumimoji="1" lang="ja-JP" altLang="en-US" smtClean="0"/>
-              <a:t>2018/10/7</a:t>
+              <a:t>2018/10/8</a:t>
             </a:fld>
             <a:endParaRPr kumimoji="1" lang="ja-JP" altLang="en-US"/>
           </a:p>
@@ -3245,7 +3245,7 @@
           <a:p>
             <a:fld id="{5AB1C2F8-01C6-2A43-BFDE-0E7A8C3DAD71}" type="datetimeFigureOut">
               <a:rPr kumimoji="1" lang="ja-JP" altLang="en-US" smtClean="0"/>
-              <a:t>2018/10/7</a:t>
+              <a:t>2018/10/8</a:t>
             </a:fld>
             <a:endParaRPr kumimoji="1" lang="ja-JP" altLang="en-US"/>
           </a:p>
@@ -3488,7 +3488,7 @@
           <a:p>
             <a:fld id="{5AB1C2F8-01C6-2A43-BFDE-0E7A8C3DAD71}" type="datetimeFigureOut">
               <a:rPr kumimoji="1" lang="ja-JP" altLang="en-US" smtClean="0"/>
-              <a:t>2018/10/7</a:t>
+              <a:t>2018/10/8</a:t>
             </a:fld>
             <a:endParaRPr kumimoji="1" lang="ja-JP" altLang="en-US"/>
           </a:p>
@@ -14279,7 +14279,7 @@
         </p:nvSpPr>
         <p:spPr>
           <a:xfrm>
-            <a:off x="1800501" y="4711596"/>
+            <a:off x="1169880" y="4739612"/>
             <a:ext cx="2432076" cy="369332"/>
           </a:xfrm>
           <a:prstGeom prst="rect">
@@ -14328,7 +14328,7 @@
         </p:nvSpPr>
         <p:spPr>
           <a:xfrm>
-            <a:off x="4660011" y="2750496"/>
+            <a:off x="4188520" y="2757550"/>
             <a:ext cx="2202847" cy="369332"/>
           </a:xfrm>
           <a:prstGeom prst="rect">
@@ -14377,7 +14377,7 @@
         </p:nvSpPr>
         <p:spPr>
           <a:xfrm>
-            <a:off x="4753277" y="3396585"/>
+            <a:off x="4476930" y="3396585"/>
             <a:ext cx="1810111" cy="369332"/>
           </a:xfrm>
           <a:prstGeom prst="rect">
@@ -14426,8 +14426,8 @@
         </p:nvSpPr>
         <p:spPr>
           <a:xfrm>
-            <a:off x="5010267" y="3922978"/>
-            <a:ext cx="1502334" cy="369332"/>
+            <a:off x="4281494" y="3984874"/>
+            <a:ext cx="2109873" cy="369332"/>
           </a:xfrm>
           <a:prstGeom prst="rect">
             <a:avLst/>
@@ -14461,7 +14461,11 @@
             </a:r>
             <a:r>
               <a:rPr kumimoji="1" lang="en-US" altLang="ja-JP" dirty="0" smtClean="0"/>
-              <a:t>(photo)</a:t>
+              <a:t>(</a:t>
+            </a:r>
+            <a:r>
+              <a:rPr kumimoji="1" lang="en-US" altLang="ja-JP" dirty="0" smtClean="0"/>
+              <a:t>photograph)</a:t>
             </a:r>
             <a:endParaRPr kumimoji="1" lang="ja-JP" altLang="en-US" dirty="0" smtClean="0"/>
           </a:p>
@@ -14510,11 +14514,7 @@
             </a:r>
             <a:r>
               <a:rPr kumimoji="1" lang="en-US" altLang="ja-JP" dirty="0" smtClean="0"/>
-              <a:t>(sampling interval</a:t>
-            </a:r>
-            <a:r>
-              <a:rPr kumimoji="1" lang="en-US" altLang="ja-JP" dirty="0" smtClean="0"/>
-              <a:t>)</a:t>
+              <a:t>(sampling interval)</a:t>
             </a:r>
             <a:endParaRPr kumimoji="1" lang="ja-JP" altLang="en-US" dirty="0" smtClean="0"/>
           </a:p>
@@ -14528,7 +14528,7 @@
         </p:nvSpPr>
         <p:spPr>
           <a:xfrm>
-            <a:off x="2064194" y="5368486"/>
+            <a:off x="1433573" y="5351471"/>
             <a:ext cx="1904689" cy="369332"/>
           </a:xfrm>
           <a:prstGeom prst="rect">
@@ -14708,8 +14708,8 @@
         </p:nvCxnSpPr>
         <p:spPr>
           <a:xfrm flipH="1">
-            <a:off x="4232577" y="4107644"/>
-            <a:ext cx="777690" cy="788618"/>
+            <a:off x="3601956" y="4169540"/>
+            <a:ext cx="679538" cy="754738"/>
           </a:xfrm>
           <a:prstGeom prst="line">
             <a:avLst/>
@@ -14741,8 +14741,8 @@
         </p:nvCxnSpPr>
         <p:spPr>
           <a:xfrm flipV="1">
-            <a:off x="3016539" y="5080928"/>
-            <a:ext cx="0" cy="287558"/>
+            <a:off x="2385918" y="5108944"/>
+            <a:ext cx="0" cy="242527"/>
           </a:xfrm>
           <a:prstGeom prst="line">
             <a:avLst/>
@@ -14771,7 +14771,7 @@
         </p:nvSpPr>
         <p:spPr>
           <a:xfrm>
-            <a:off x="7348258" y="3191429"/>
+            <a:off x="9690975" y="3399671"/>
             <a:ext cx="1726755" cy="369332"/>
           </a:xfrm>
           <a:prstGeom prst="rect">
@@ -14805,7 +14805,7 @@
               <a:t>送信 </a:t>
             </a:r>
             <a:r>
-              <a:rPr kumimoji="1" lang="en-US" altLang="ja-JP" dirty="0" smtClean="0"/>
+              <a:rPr kumimoji="1" lang="en-US" altLang="ja-JP" smtClean="0"/>
               <a:t>(sending)</a:t>
             </a:r>
             <a:endParaRPr kumimoji="1" lang="ja-JP" altLang="en-US" dirty="0" smtClean="0"/>
@@ -14823,8 +14823,8 @@
         </p:nvCxnSpPr>
         <p:spPr>
           <a:xfrm flipV="1">
-            <a:off x="2885395" y="2317536"/>
-            <a:ext cx="1" cy="644496"/>
+            <a:off x="2507023" y="2317536"/>
+            <a:ext cx="378373" cy="634841"/>
           </a:xfrm>
           <a:prstGeom prst="line">
             <a:avLst/>
@@ -14849,15 +14849,15 @@
         <p:nvCxnSpPr>
           <p:cNvPr id="25" name="直線コネクタ 24"/>
           <p:cNvCxnSpPr>
-            <a:stCxn id="21" idx="1"/>
+            <a:stCxn id="39" idx="1"/>
             <a:endCxn id="5" idx="3"/>
           </p:cNvCxnSpPr>
           <p:nvPr/>
         </p:nvCxnSpPr>
         <p:spPr>
           <a:xfrm flipH="1" flipV="1">
-            <a:off x="6862858" y="2935162"/>
-            <a:ext cx="485400" cy="440933"/>
+            <a:off x="6391367" y="2942216"/>
+            <a:ext cx="306262" cy="588604"/>
           </a:xfrm>
           <a:prstGeom prst="line">
             <a:avLst/>
@@ -14882,15 +14882,15 @@
         <p:nvCxnSpPr>
           <p:cNvPr id="33" name="直線コネクタ 32"/>
           <p:cNvCxnSpPr>
-            <a:stCxn id="21" idx="1"/>
+            <a:stCxn id="39" idx="1"/>
             <a:endCxn id="8" idx="3"/>
           </p:cNvCxnSpPr>
           <p:nvPr/>
         </p:nvCxnSpPr>
         <p:spPr>
           <a:xfrm flipH="1">
-            <a:off x="6563388" y="3376095"/>
-            <a:ext cx="784870" cy="205156"/>
+            <a:off x="6287041" y="3530820"/>
+            <a:ext cx="410588" cy="50431"/>
           </a:xfrm>
           <a:prstGeom prst="line">
             <a:avLst/>
@@ -14915,15 +14915,15 @@
         <p:nvCxnSpPr>
           <p:cNvPr id="37" name="直線コネクタ 36"/>
           <p:cNvCxnSpPr>
-            <a:stCxn id="21" idx="1"/>
+            <a:stCxn id="39" idx="1"/>
             <a:endCxn id="9" idx="3"/>
           </p:cNvCxnSpPr>
           <p:nvPr/>
         </p:nvCxnSpPr>
         <p:spPr>
           <a:xfrm flipH="1">
-            <a:off x="6512601" y="3376095"/>
-            <a:ext cx="835657" cy="731549"/>
+            <a:off x="6391367" y="3530820"/>
+            <a:ext cx="306262" cy="638720"/>
           </a:xfrm>
           <a:prstGeom prst="line">
             <a:avLst/>
@@ -14956,7 +14956,7 @@
         <p:spPr>
           <a:xfrm flipH="1" flipV="1">
             <a:off x="1853981" y="3999984"/>
-            <a:ext cx="1162558" cy="711612"/>
+            <a:ext cx="531937" cy="739628"/>
           </a:xfrm>
           <a:prstGeom prst="line">
             <a:avLst/>
@@ -15018,7 +15018,7 @@
         </p:nvSpPr>
         <p:spPr>
           <a:xfrm>
-            <a:off x="1683784" y="2962032"/>
+            <a:off x="1305412" y="2952377"/>
             <a:ext cx="2403222" cy="369332"/>
           </a:xfrm>
           <a:prstGeom prst="rect">
@@ -15053,15 +15053,7 @@
             </a:r>
             <a:r>
               <a:rPr kumimoji="1" lang="en-US" altLang="ja-JP" dirty="0" smtClean="0"/>
-              <a:t>(</a:t>
-            </a:r>
-            <a:r>
-              <a:rPr kumimoji="1" lang="en-US" altLang="ja-JP" dirty="0" smtClean="0"/>
-              <a:t>sensing</a:t>
-            </a:r>
-            <a:r>
-              <a:rPr kumimoji="1" lang="en-US" altLang="ja-JP" dirty="0" smtClean="0"/>
-              <a:t>)</a:t>
+              <a:t>(sensing)</a:t>
             </a:r>
             <a:endParaRPr kumimoji="1" lang="ja-JP" altLang="en-US" dirty="0" smtClean="0"/>
           </a:p>
@@ -15078,8 +15070,8 @@
         </p:nvCxnSpPr>
         <p:spPr>
           <a:xfrm flipH="1">
-            <a:off x="4087006" y="2935162"/>
-            <a:ext cx="573005" cy="211536"/>
+            <a:off x="3708634" y="2942216"/>
+            <a:ext cx="479886" cy="194827"/>
           </a:xfrm>
           <a:prstGeom prst="line">
             <a:avLst/>
@@ -15111,8 +15103,8 @@
         </p:nvCxnSpPr>
         <p:spPr>
           <a:xfrm flipH="1" flipV="1">
-            <a:off x="4087006" y="3146698"/>
-            <a:ext cx="666271" cy="434553"/>
+            <a:off x="3708634" y="3137043"/>
+            <a:ext cx="768296" cy="444208"/>
           </a:xfrm>
           <a:prstGeom prst="line">
             <a:avLst/>
@@ -15496,14 +15488,14 @@
           <p:cNvPr id="109" name="直線コネクタ 108"/>
           <p:cNvCxnSpPr>
             <a:stCxn id="107" idx="2"/>
-            <a:endCxn id="21" idx="3"/>
+            <a:endCxn id="21" idx="0"/>
           </p:cNvCxnSpPr>
           <p:nvPr/>
         </p:nvCxnSpPr>
         <p:spPr>
-          <a:xfrm flipH="1">
-            <a:off x="9075013" y="2935162"/>
-            <a:ext cx="1135787" cy="440933"/>
+          <a:xfrm>
+            <a:off x="10210800" y="2935162"/>
+            <a:ext cx="343553" cy="464509"/>
           </a:xfrm>
           <a:prstGeom prst="line">
             <a:avLst/>
@@ -15584,8 +15576,90 @@
         </p:nvCxnSpPr>
         <p:spPr>
           <a:xfrm flipH="1">
-            <a:off x="1853981" y="3331364"/>
-            <a:ext cx="1031414" cy="299288"/>
+            <a:off x="1853981" y="3321709"/>
+            <a:ext cx="653042" cy="308943"/>
+          </a:xfrm>
+          <a:prstGeom prst="line">
+            <a:avLst/>
+          </a:prstGeom>
+        </p:spPr>
+        <p:style>
+          <a:lnRef idx="1">
+            <a:schemeClr val="accent1"/>
+          </a:lnRef>
+          <a:fillRef idx="0">
+            <a:schemeClr val="accent1"/>
+          </a:fillRef>
+          <a:effectRef idx="0">
+            <a:schemeClr val="accent1"/>
+          </a:effectRef>
+          <a:fontRef idx="minor">
+            <a:schemeClr val="tx1"/>
+          </a:fontRef>
+        </p:style>
+      </p:cxnSp>
+      <p:sp>
+        <p:nvSpPr>
+          <p:cNvPr id="39" name="テキスト ボックス 38"/>
+          <p:cNvSpPr txBox="1"/>
+          <p:nvPr/>
+        </p:nvSpPr>
+        <p:spPr>
+          <a:xfrm>
+            <a:off x="6697629" y="3346154"/>
+            <a:ext cx="2528256" cy="369332"/>
+          </a:xfrm>
+          <a:prstGeom prst="rect">
+            <a:avLst/>
+          </a:prstGeom>
+        </p:spPr>
+        <p:style>
+          <a:lnRef idx="2">
+            <a:schemeClr val="accent1">
+              <a:shade val="50000"/>
+            </a:schemeClr>
+          </a:lnRef>
+          <a:fillRef idx="1">
+            <a:schemeClr val="accent1"/>
+          </a:fillRef>
+          <a:effectRef idx="0">
+            <a:schemeClr val="accent1"/>
+          </a:effectRef>
+          <a:fontRef idx="minor">
+            <a:schemeClr val="lt1"/>
+          </a:fontRef>
+        </p:style>
+        <p:txBody>
+          <a:bodyPr wrap="none" rtlCol="0">
+            <a:spAutoFit/>
+          </a:bodyPr>
+          <a:lstStyle/>
+          <a:p>
+            <a:r>
+              <a:rPr kumimoji="1" lang="ja-JP" altLang="en-US" dirty="0" smtClean="0"/>
+              <a:t>送信データ </a:t>
+            </a:r>
+            <a:r>
+              <a:rPr kumimoji="1" lang="en-US" altLang="ja-JP" dirty="0" smtClean="0"/>
+              <a:t>(message)</a:t>
+            </a:r>
+            <a:endParaRPr kumimoji="1" lang="ja-JP" altLang="en-US" dirty="0" smtClean="0"/>
+          </a:p>
+        </p:txBody>
+      </p:sp>
+      <p:cxnSp>
+        <p:nvCxnSpPr>
+          <p:cNvPr id="60" name="直線コネクタ 59"/>
+          <p:cNvCxnSpPr>
+            <a:stCxn id="21" idx="1"/>
+            <a:endCxn id="39" idx="3"/>
+          </p:cNvCxnSpPr>
+          <p:nvPr/>
+        </p:nvCxnSpPr>
+        <p:spPr>
+          <a:xfrm flipH="1" flipV="1">
+            <a:off x="9225885" y="3530820"/>
+            <a:ext cx="465090" cy="53517"/>
           </a:xfrm>
           <a:prstGeom prst="line">
             <a:avLst/>

</xml_diff>